<commit_message>
config for first demo with system message
</commit_message>
<xml_diff>
--- a/sessions/room1_15_30/azure-day-ChatBot.pptx
+++ b/sessions/room1_15_30/azure-day-ChatBot.pptx
@@ -12,7 +12,7 @@
   </p:handoutMasterIdLst>
   <p:sldIdLst>
     <p:sldId id="256" r:id="rId5"/>
-    <p:sldId id="258" r:id="rId6"/>
+    <p:sldId id="317" r:id="rId6"/>
     <p:sldId id="264" r:id="rId7"/>
     <p:sldId id="266" r:id="rId8"/>
     <p:sldId id="267" r:id="rId9"/>
@@ -1243,7 +1243,7 @@
           <a:p>
             <a:fld id="{CAA74DD2-8E53-470B-8646-02BB9552BE22}" type="datetimeFigureOut">
               <a:rPr lang="it-IT" smtClean="0"/>
-              <a:t>13/10/2023</a:t>
+              <a:t>14/10/2023</a:t>
             </a:fld>
             <a:endParaRPr lang="it-IT"/>
           </a:p>
@@ -1972,7 +1972,7 @@
           <a:p>
             <a:fld id="{A73219E7-05B6-4637-82E9-CF903832277D}" type="datetimeFigureOut">
               <a:rPr lang="en-US" smtClean="0"/>
-              <a:t>10/13/2023</a:t>
+              <a:t>10/14/2023</a:t>
             </a:fld>
             <a:endParaRPr lang="en-US"/>
           </a:p>
@@ -21283,10 +21283,245 @@
           <a:chExt cx="0" cy="0"/>
         </a:xfrm>
       </p:grpSpPr>
+      <p:sp>
+        <p:nvSpPr>
+          <p:cNvPr id="2" name="Content Placeholder 1">
+            <a:extLst>
+              <a:ext uri="{FF2B5EF4-FFF2-40B4-BE49-F238E27FC236}">
+                <a16:creationId xmlns:a16="http://schemas.microsoft.com/office/drawing/2014/main" id="{89AB57CE-06E0-4733-25DC-5522C9684124}"/>
+              </a:ext>
+            </a:extLst>
+          </p:cNvPr>
+          <p:cNvSpPr>
+            <a:spLocks noGrp="1"/>
+          </p:cNvSpPr>
+          <p:nvPr>
+            <p:ph idx="1"/>
+          </p:nvPr>
+        </p:nvSpPr>
+        <p:spPr/>
+        <p:txBody>
+          <a:bodyPr/>
+          <a:lstStyle/>
+          <a:p>
+            <a:pPr marL="0" indent="0">
+              <a:buNone/>
+            </a:pPr>
+            <a:r>
+              <a:rPr lang="en-US" dirty="0"/>
+              <a:t>Come far </a:t>
+            </a:r>
+            <a:r>
+              <a:rPr lang="en-US" dirty="0" err="1"/>
+              <a:t>rispondere</a:t>
+            </a:r>
+            <a:r>
+              <a:rPr lang="en-US" dirty="0"/>
+              <a:t> chatgpt sun </a:t>
+            </a:r>
+            <a:r>
+              <a:rPr lang="en-US" dirty="0" err="1"/>
+              <a:t>ambito</a:t>
+            </a:r>
+            <a:r>
+              <a:rPr lang="en-US" dirty="0"/>
+              <a:t>, un </a:t>
+            </a:r>
+            <a:r>
+              <a:rPr lang="en-US" dirty="0" err="1"/>
+              <a:t>dominio</a:t>
+            </a:r>
+            <a:r>
+              <a:rPr lang="en-US" dirty="0"/>
+              <a:t> di </a:t>
+            </a:r>
+            <a:r>
+              <a:rPr lang="en-US" dirty="0" err="1"/>
+              <a:t>di</a:t>
+            </a:r>
+            <a:r>
+              <a:rPr lang="en-US" dirty="0"/>
+              <a:t> </a:t>
+            </a:r>
+            <a:r>
+              <a:rPr lang="en-US" dirty="0" err="1"/>
+              <a:t>conoscenza</a:t>
+            </a:r>
+            <a:r>
+              <a:rPr lang="en-US" dirty="0"/>
+              <a:t> e </a:t>
+            </a:r>
+            <a:r>
+              <a:rPr lang="en-US" dirty="0" err="1"/>
+              <a:t>sapere</a:t>
+            </a:r>
+            <a:r>
+              <a:rPr lang="en-US" dirty="0"/>
+              <a:t>  </a:t>
+            </a:r>
+            <a:r>
+              <a:rPr lang="en-US" dirty="0" err="1"/>
+              <a:t>che</a:t>
+            </a:r>
+            <a:r>
+              <a:rPr lang="en-US" dirty="0"/>
+              <a:t> non fa </a:t>
+            </a:r>
+            <a:r>
+              <a:rPr lang="en-US" dirty="0" err="1"/>
+              <a:t>parte</a:t>
+            </a:r>
+            <a:r>
+              <a:rPr lang="en-US" dirty="0"/>
+              <a:t> del set di </a:t>
+            </a:r>
+            <a:r>
+              <a:rPr lang="en-US" dirty="0" err="1"/>
+              <a:t>informazioni</a:t>
+            </a:r>
+            <a:r>
+              <a:rPr lang="en-US" dirty="0"/>
+              <a:t> </a:t>
+            </a:r>
+            <a:r>
+              <a:rPr lang="en-US" dirty="0" err="1"/>
+              <a:t>iniziali</a:t>
+            </a:r>
+            <a:r>
+              <a:rPr lang="en-US" dirty="0"/>
+              <a:t> </a:t>
+            </a:r>
+            <a:r>
+              <a:rPr lang="en-US" dirty="0" err="1"/>
+              <a:t>utilizzate</a:t>
+            </a:r>
+            <a:r>
+              <a:rPr lang="en-US" dirty="0"/>
+              <a:t> </a:t>
+            </a:r>
+            <a:r>
+              <a:rPr lang="en-US" dirty="0" err="1"/>
+              <a:t>nell'adddestramento</a:t>
+            </a:r>
+            <a:r>
+              <a:rPr lang="en-US" dirty="0"/>
+              <a:t> </a:t>
+            </a:r>
+            <a:r>
+              <a:rPr lang="en-US" dirty="0" err="1"/>
+              <a:t>iniziale</a:t>
+            </a:r>
+            <a:r>
+              <a:rPr lang="en-US" dirty="0"/>
+              <a:t> del </a:t>
+            </a:r>
+            <a:r>
+              <a:rPr lang="en-US" dirty="0" err="1"/>
+              <a:t>modello</a:t>
+            </a:r>
+            <a:endParaRPr lang="en-US" dirty="0"/>
+          </a:p>
+          <a:p>
+            <a:endParaRPr lang="en-US" dirty="0"/>
+          </a:p>
+          <a:p>
+            <a:pPr marL="0" indent="0">
+              <a:buNone/>
+            </a:pPr>
+            <a:r>
+              <a:rPr lang="en-US" dirty="0"/>
+              <a:t>.. </a:t>
+            </a:r>
+            <a:r>
+              <a:rPr lang="en-US" dirty="0" err="1"/>
+              <a:t>usando</a:t>
+            </a:r>
+            <a:r>
+              <a:rPr lang="en-US" dirty="0"/>
+              <a:t> la </a:t>
+            </a:r>
+            <a:r>
+              <a:rPr lang="en-US" dirty="0" err="1"/>
+              <a:t>tecnica</a:t>
+            </a:r>
+            <a:r>
+              <a:rPr lang="en-US" dirty="0"/>
+              <a:t> </a:t>
+            </a:r>
+            <a:r>
+              <a:rPr lang="en-US" dirty="0" err="1"/>
+              <a:t>che</a:t>
+            </a:r>
+            <a:r>
+              <a:rPr lang="en-US" dirty="0"/>
+              <a:t> </a:t>
+            </a:r>
+            <a:r>
+              <a:rPr lang="en-US" dirty="0" err="1"/>
+              <a:t>prende</a:t>
+            </a:r>
+            <a:r>
+              <a:rPr lang="en-US" dirty="0"/>
+              <a:t> il </a:t>
+            </a:r>
+            <a:r>
+              <a:rPr lang="en-US" dirty="0" err="1"/>
+              <a:t>nome</a:t>
+            </a:r>
+            <a:r>
+              <a:rPr lang="en-US" dirty="0"/>
+              <a:t> di </a:t>
+            </a:r>
+          </a:p>
+          <a:p>
+            <a:pPr marL="0" indent="0">
+              <a:buNone/>
+            </a:pPr>
+            <a:r>
+              <a:rPr lang="en-US" dirty="0"/>
+              <a:t>   Retrieval Augmented Generation (R.A.G.)</a:t>
+            </a:r>
+          </a:p>
+        </p:txBody>
+      </p:sp>
+      <p:sp>
+        <p:nvSpPr>
+          <p:cNvPr id="3" name="Title 2">
+            <a:extLst>
+              <a:ext uri="{FF2B5EF4-FFF2-40B4-BE49-F238E27FC236}">
+                <a16:creationId xmlns:a16="http://schemas.microsoft.com/office/drawing/2014/main" id="{30372987-7A40-8FF2-149A-62877E8E0C79}"/>
+              </a:ext>
+            </a:extLst>
+          </p:cNvPr>
+          <p:cNvSpPr>
+            <a:spLocks noGrp="1"/>
+          </p:cNvSpPr>
+          <p:nvPr>
+            <p:ph type="title"/>
+          </p:nvPr>
+        </p:nvSpPr>
+        <p:spPr/>
+        <p:txBody>
+          <a:bodyPr>
+            <a:normAutofit fontScale="90000"/>
+          </a:bodyPr>
+          <a:lstStyle/>
+          <a:p>
+            <a:r>
+              <a:rPr lang="en-US" dirty="0" err="1"/>
+              <a:t>rifrasando</a:t>
+            </a:r>
+            <a:r>
+              <a:rPr lang="en-US" dirty="0"/>
+              <a:t> ..</a:t>
+            </a:r>
+          </a:p>
+        </p:txBody>
+      </p:sp>
     </p:spTree>
     <p:extLst>
       <p:ext uri="{BB962C8B-B14F-4D97-AF65-F5344CB8AC3E}">
-        <p14:creationId xmlns:p14="http://schemas.microsoft.com/office/powerpoint/2010/main" val="1221883348"/>
+        <p14:creationId xmlns:p14="http://schemas.microsoft.com/office/powerpoint/2010/main" val="1376094599"/>
       </p:ext>
     </p:extLst>
   </p:cSld>

</xml_diff>